<commit_message>
Final step ppt update
</commit_message>
<xml_diff>
--- a/Taiwan Mandarin accessibility project – final step.pptx
+++ b/Taiwan Mandarin accessibility project – final step.pptx
@@ -4640,7 +4640,7 @@
       </p:grpSpPr>
       <p:sp useBgFill="1">
         <p:nvSpPr>
-          <p:cNvPr id="8" name="Rectangle 7">
+          <p:cNvPr id="19" name="Rectangle 18">
             <a:extLst>
               <a:ext uri="{FF2B5EF4-FFF2-40B4-BE49-F238E27FC236}">
                 <a16:creationId xmlns:a16="http://schemas.microsoft.com/office/drawing/2014/main" id="{92B0CFF1-78D7-4A83-A95E-71F9E3831622}"/>
@@ -4700,10 +4700,10 @@
       </p:sp>
       <p:sp>
         <p:nvSpPr>
-          <p:cNvPr id="10" name="Rectangle 9">
-            <a:extLst>
-              <a:ext uri="{FF2B5EF4-FFF2-40B4-BE49-F238E27FC236}">
-                <a16:creationId xmlns:a16="http://schemas.microsoft.com/office/drawing/2014/main" id="{9BD148E7-1EDB-4129-A130-04858F701441}"/>
+          <p:cNvPr id="21" name="Rectangle 20">
+            <a:extLst>
+              <a:ext uri="{FF2B5EF4-FFF2-40B4-BE49-F238E27FC236}">
+                <a16:creationId xmlns:a16="http://schemas.microsoft.com/office/drawing/2014/main" id="{EC84EE41-863A-4DE9-9A51-4F014D681F70}"/>
               </a:ext>
               <a:ext uri="{C183D7F6-B498-43B3-948B-1728B52AA6E4}">
                 <adec:decorative xmlns:adec="http://schemas.microsoft.com/office/drawing/2017/decorative" val="1"/>
@@ -4723,8 +4723,8 @@
         </p:nvSpPr>
         <p:spPr>
           <a:xfrm>
-            <a:off x="482600" y="489855"/>
-            <a:ext cx="11147071" cy="5851265"/>
+            <a:off x="479416" y="485369"/>
+            <a:ext cx="11147071" cy="2460838"/>
           </a:xfrm>
           <a:prstGeom prst="rect">
             <a:avLst/>
@@ -4781,18 +4781,18 @@
         </p:nvSpPr>
         <p:spPr>
           <a:xfrm>
-            <a:off x="680605" y="976160"/>
-            <a:ext cx="5415395" cy="4902115"/>
-          </a:xfrm>
-        </p:spPr>
-        <p:txBody>
-          <a:bodyPr anchor="ctr">
+            <a:off x="482601" y="976160"/>
+            <a:ext cx="8411120" cy="1493871"/>
+          </a:xfrm>
+        </p:spPr>
+        <p:txBody>
+          <a:bodyPr>
             <a:normAutofit/>
           </a:bodyPr>
           <a:lstStyle/>
           <a:p>
             <a:r>
-              <a:rPr lang="en-HK" dirty="0"/>
+              <a:rPr lang="en-HK" sz="7200"/>
               <a:t>Annotating number</a:t>
             </a:r>
           </a:p>
@@ -4800,10 +4800,10 @@
       </p:sp>
       <p:cxnSp>
         <p:nvCxnSpPr>
-          <p:cNvPr id="12" name="Straight Connector 11">
-            <a:extLst>
-              <a:ext uri="{FF2B5EF4-FFF2-40B4-BE49-F238E27FC236}">
-                <a16:creationId xmlns:a16="http://schemas.microsoft.com/office/drawing/2014/main" id="{8E1E68C9-4F6E-4640-AE06-FCA671F7D5A6}"/>
+          <p:cNvPr id="23" name="Straight Connector 22">
+            <a:extLst>
+              <a:ext uri="{FF2B5EF4-FFF2-40B4-BE49-F238E27FC236}">
+                <a16:creationId xmlns:a16="http://schemas.microsoft.com/office/drawing/2014/main" id="{23135360-3A7F-436F-B1EA-3628A78B57BD}"/>
               </a:ext>
               <a:ext uri="{C183D7F6-B498-43B3-948B-1728B52AA6E4}">
                 <adec:decorative xmlns:adec="http://schemas.microsoft.com/office/drawing/2017/decorative" val="1"/>
@@ -4850,6 +4850,58 @@
           </a:fontRef>
         </p:style>
       </p:cxnSp>
+      <p:cxnSp>
+        <p:nvCxnSpPr>
+          <p:cNvPr id="25" name="Straight Connector 24">
+            <a:extLst>
+              <a:ext uri="{FF2B5EF4-FFF2-40B4-BE49-F238E27FC236}">
+                <a16:creationId xmlns:a16="http://schemas.microsoft.com/office/drawing/2014/main" id="{08990BBA-8A0B-4EF5-A122-0815DEC19410}"/>
+              </a:ext>
+              <a:ext uri="{C183D7F6-B498-43B3-948B-1728B52AA6E4}">
+                <adec:decorative xmlns:adec="http://schemas.microsoft.com/office/drawing/2017/decorative" val="1"/>
+              </a:ext>
+            </a:extLst>
+          </p:cNvPr>
+          <p:cNvCxnSpPr>
+            <a:cxnSpLocks noGrp="1" noRot="1" noChangeAspect="1" noMove="1" noResize="1" noEditPoints="1" noAdjustHandles="1" noChangeArrowheads="1" noChangeShapeType="1"/>
+          </p:cNvCxnSpPr>
+          <p:nvPr>
+            <p:extLst>
+              <p:ext uri="{386F3935-93C4-4BCD-93E2-E3B085C9AB24}">
+                <p16:designElem xmlns:p16="http://schemas.microsoft.com/office/powerpoint/2015/main" val="1"/>
+              </p:ext>
+            </p:extLst>
+          </p:nvPr>
+        </p:nvCxnSpPr>
+        <p:spPr>
+          <a:xfrm>
+            <a:off x="482600" y="2918401"/>
+            <a:ext cx="11147071" cy="0"/>
+          </a:xfrm>
+          <a:prstGeom prst="line">
+            <a:avLst/>
+          </a:prstGeom>
+          <a:ln w="28575">
+            <a:solidFill>
+              <a:schemeClr val="tx1"/>
+            </a:solidFill>
+          </a:ln>
+        </p:spPr>
+        <p:style>
+          <a:lnRef idx="1">
+            <a:schemeClr val="dk1"/>
+          </a:lnRef>
+          <a:fillRef idx="0">
+            <a:schemeClr val="dk1"/>
+          </a:fillRef>
+          <a:effectRef idx="0">
+            <a:schemeClr val="dk1"/>
+          </a:effectRef>
+          <a:fontRef idx="minor">
+            <a:schemeClr val="tx1"/>
+          </a:fontRef>
+        </p:style>
+      </p:cxnSp>
       <p:sp>
         <p:nvSpPr>
           <p:cNvPr id="3" name="Content Placeholder 2">
@@ -4868,12 +4920,12 @@
         </p:nvSpPr>
         <p:spPr>
           <a:xfrm>
-            <a:off x="6324144" y="976160"/>
-            <a:ext cx="5114069" cy="4902125"/>
-          </a:xfrm>
-        </p:spPr>
-        <p:txBody>
-          <a:bodyPr anchor="ctr">
+            <a:off x="482600" y="3408254"/>
+            <a:ext cx="8411119" cy="2470031"/>
+          </a:xfrm>
+        </p:spPr>
+        <p:txBody>
+          <a:bodyPr>
             <a:normAutofit/>
           </a:bodyPr>
           <a:lstStyle/>
@@ -4883,7 +4935,7 @@
               <a:buChar char="•"/>
             </a:pPr>
             <a:r>
-              <a:rPr lang="en-HK" sz="2000"/>
+              <a:rPr lang="en-HK" sz="2000" dirty="0"/>
               <a:t>Go to the Track tab</a:t>
             </a:r>
           </a:p>
@@ -4893,7 +4945,7 @@
               <a:buChar char="•"/>
             </a:pPr>
             <a:r>
-              <a:rPr lang="en-HK" sz="2000"/>
+              <a:rPr lang="en-HK" sz="2000" dirty="0"/>
               <a:t>Click on a column &gt; Select field &gt; Number</a:t>
             </a:r>
           </a:p>
@@ -4903,7 +4955,7 @@
               <a:buChar char="•"/>
             </a:pPr>
             <a:r>
-              <a:rPr lang="en-HK" sz="2000"/>
+              <a:rPr lang="en-HK" sz="2000" dirty="0"/>
               <a:t>Type P in a field if:</a:t>
             </a:r>
           </a:p>
@@ -4956,7 +5008,7 @@
           <a:p>
             <a:pPr marL="342900" indent="-342900"/>
             <a:r>
-              <a:rPr lang="en-HK" altLang="zh-TW" sz="2000"/>
+              <a:rPr lang="en-HK" altLang="zh-TW" sz="2000" dirty="0"/>
               <a:t>	Otherwise leave blank</a:t>
             </a:r>
           </a:p>
@@ -4964,10 +5016,10 @@
       </p:sp>
       <p:cxnSp>
         <p:nvCxnSpPr>
-          <p:cNvPr id="14" name="Straight Connector 13">
-            <a:extLst>
-              <a:ext uri="{FF2B5EF4-FFF2-40B4-BE49-F238E27FC236}">
-                <a16:creationId xmlns:a16="http://schemas.microsoft.com/office/drawing/2014/main" id="{8DF3F0BE-4FF5-481A-9206-F765D61B5F6A}"/>
+          <p:cNvPr id="27" name="Straight Connector 26">
+            <a:extLst>
+              <a:ext uri="{FF2B5EF4-FFF2-40B4-BE49-F238E27FC236}">
+                <a16:creationId xmlns:a16="http://schemas.microsoft.com/office/drawing/2014/main" id="{38045D80-B59B-4760-8DF9-AECD53044DA6}"/>
               </a:ext>
               <a:ext uri="{C183D7F6-B498-43B3-948B-1728B52AA6E4}">
                 <adec:decorative xmlns:adec="http://schemas.microsoft.com/office/drawing/2017/decorative" val="1"/>
@@ -5054,7 +5106,7 @@
       </p:grpSpPr>
       <p:sp useBgFill="1">
         <p:nvSpPr>
-          <p:cNvPr id="8" name="Rectangle 7">
+          <p:cNvPr id="19" name="Rectangle 18">
             <a:extLst>
               <a:ext uri="{FF2B5EF4-FFF2-40B4-BE49-F238E27FC236}">
                 <a16:creationId xmlns:a16="http://schemas.microsoft.com/office/drawing/2014/main" id="{92B0CFF1-78D7-4A83-A95E-71F9E3831622}"/>
@@ -5114,10 +5166,10 @@
       </p:sp>
       <p:sp>
         <p:nvSpPr>
-          <p:cNvPr id="10" name="Rectangle 9">
-            <a:extLst>
-              <a:ext uri="{FF2B5EF4-FFF2-40B4-BE49-F238E27FC236}">
-                <a16:creationId xmlns:a16="http://schemas.microsoft.com/office/drawing/2014/main" id="{9BD148E7-1EDB-4129-A130-04858F701441}"/>
+          <p:cNvPr id="21" name="Rectangle 20">
+            <a:extLst>
+              <a:ext uri="{FF2B5EF4-FFF2-40B4-BE49-F238E27FC236}">
+                <a16:creationId xmlns:a16="http://schemas.microsoft.com/office/drawing/2014/main" id="{EC84EE41-863A-4DE9-9A51-4F014D681F70}"/>
               </a:ext>
               <a:ext uri="{C183D7F6-B498-43B3-948B-1728B52AA6E4}">
                 <adec:decorative xmlns:adec="http://schemas.microsoft.com/office/drawing/2017/decorative" val="1"/>
@@ -5137,8 +5189,8 @@
         </p:nvSpPr>
         <p:spPr>
           <a:xfrm>
-            <a:off x="482600" y="489855"/>
-            <a:ext cx="11147071" cy="5851265"/>
+            <a:off x="479416" y="485369"/>
+            <a:ext cx="11147071" cy="2460838"/>
           </a:xfrm>
           <a:prstGeom prst="rect">
             <a:avLst/>
@@ -5195,18 +5247,18 @@
         </p:nvSpPr>
         <p:spPr>
           <a:xfrm>
-            <a:off x="680605" y="976160"/>
-            <a:ext cx="5415395" cy="4902115"/>
-          </a:xfrm>
-        </p:spPr>
-        <p:txBody>
-          <a:bodyPr anchor="ctr">
+            <a:off x="482601" y="976160"/>
+            <a:ext cx="8411120" cy="1493871"/>
+          </a:xfrm>
+        </p:spPr>
+        <p:txBody>
+          <a:bodyPr>
             <a:normAutofit/>
           </a:bodyPr>
           <a:lstStyle/>
           <a:p>
             <a:r>
-              <a:rPr lang="en-HK" dirty="0"/>
+              <a:rPr lang="en-HK" sz="6700"/>
               <a:t>Annotating lexicality</a:t>
             </a:r>
           </a:p>
@@ -5214,10 +5266,10 @@
       </p:sp>
       <p:cxnSp>
         <p:nvCxnSpPr>
-          <p:cNvPr id="12" name="Straight Connector 11">
-            <a:extLst>
-              <a:ext uri="{FF2B5EF4-FFF2-40B4-BE49-F238E27FC236}">
-                <a16:creationId xmlns:a16="http://schemas.microsoft.com/office/drawing/2014/main" id="{8E1E68C9-4F6E-4640-AE06-FCA671F7D5A6}"/>
+          <p:cNvPr id="23" name="Straight Connector 22">
+            <a:extLst>
+              <a:ext uri="{FF2B5EF4-FFF2-40B4-BE49-F238E27FC236}">
+                <a16:creationId xmlns:a16="http://schemas.microsoft.com/office/drawing/2014/main" id="{23135360-3A7F-436F-B1EA-3628A78B57BD}"/>
               </a:ext>
               <a:ext uri="{C183D7F6-B498-43B3-948B-1728B52AA6E4}">
                 <adec:decorative xmlns:adec="http://schemas.microsoft.com/office/drawing/2017/decorative" val="1"/>
@@ -5264,6 +5316,58 @@
           </a:fontRef>
         </p:style>
       </p:cxnSp>
+      <p:cxnSp>
+        <p:nvCxnSpPr>
+          <p:cNvPr id="25" name="Straight Connector 24">
+            <a:extLst>
+              <a:ext uri="{FF2B5EF4-FFF2-40B4-BE49-F238E27FC236}">
+                <a16:creationId xmlns:a16="http://schemas.microsoft.com/office/drawing/2014/main" id="{08990BBA-8A0B-4EF5-A122-0815DEC19410}"/>
+              </a:ext>
+              <a:ext uri="{C183D7F6-B498-43B3-948B-1728B52AA6E4}">
+                <adec:decorative xmlns:adec="http://schemas.microsoft.com/office/drawing/2017/decorative" val="1"/>
+              </a:ext>
+            </a:extLst>
+          </p:cNvPr>
+          <p:cNvCxnSpPr>
+            <a:cxnSpLocks noGrp="1" noRot="1" noChangeAspect="1" noMove="1" noResize="1" noEditPoints="1" noAdjustHandles="1" noChangeArrowheads="1" noChangeShapeType="1"/>
+          </p:cNvCxnSpPr>
+          <p:nvPr>
+            <p:extLst>
+              <p:ext uri="{386F3935-93C4-4BCD-93E2-E3B085C9AB24}">
+                <p16:designElem xmlns:p16="http://schemas.microsoft.com/office/powerpoint/2015/main" val="1"/>
+              </p:ext>
+            </p:extLst>
+          </p:nvPr>
+        </p:nvCxnSpPr>
+        <p:spPr>
+          <a:xfrm>
+            <a:off x="482600" y="2918401"/>
+            <a:ext cx="11147071" cy="0"/>
+          </a:xfrm>
+          <a:prstGeom prst="line">
+            <a:avLst/>
+          </a:prstGeom>
+          <a:ln w="28575">
+            <a:solidFill>
+              <a:schemeClr val="tx1"/>
+            </a:solidFill>
+          </a:ln>
+        </p:spPr>
+        <p:style>
+          <a:lnRef idx="1">
+            <a:schemeClr val="dk1"/>
+          </a:lnRef>
+          <a:fillRef idx="0">
+            <a:schemeClr val="dk1"/>
+          </a:fillRef>
+          <a:effectRef idx="0">
+            <a:schemeClr val="dk1"/>
+          </a:effectRef>
+          <a:fontRef idx="minor">
+            <a:schemeClr val="tx1"/>
+          </a:fontRef>
+        </p:style>
+      </p:cxnSp>
       <p:sp>
         <p:nvSpPr>
           <p:cNvPr id="3" name="Content Placeholder 2">
@@ -5282,17 +5386,20 @@
         </p:nvSpPr>
         <p:spPr>
           <a:xfrm>
-            <a:off x="5551056" y="976160"/>
-            <a:ext cx="5887158" cy="4902125"/>
-          </a:xfrm>
-        </p:spPr>
-        <p:txBody>
-          <a:bodyPr anchor="ctr">
-            <a:normAutofit/>
+            <a:off x="482600" y="3408254"/>
+            <a:ext cx="8411119" cy="2470031"/>
+          </a:xfrm>
+        </p:spPr>
+        <p:txBody>
+          <a:bodyPr>
+            <a:normAutofit fontScale="92500" lnSpcReduction="10000"/>
           </a:bodyPr>
           <a:lstStyle/>
           <a:p>
             <a:pPr marL="342900" indent="-342900">
+              <a:lnSpc>
+                <a:spcPct val="90000"/>
+              </a:lnSpc>
               <a:buFont typeface="Arial" panose="020B0604020202020204" pitchFamily="34" charset="0"/>
               <a:buChar char="•"/>
             </a:pPr>
@@ -5303,16 +5410,36 @@
           </a:p>
           <a:p>
             <a:pPr marL="342900" indent="-342900">
+              <a:lnSpc>
+                <a:spcPct val="90000"/>
+              </a:lnSpc>
               <a:buFont typeface="Arial" panose="020B0604020202020204" pitchFamily="34" charset="0"/>
               <a:buChar char="•"/>
             </a:pPr>
             <a:r>
+              <a:rPr lang="en-HK" sz="2000" dirty="0"/>
+              <a:t>Choose the lexicality field</a:t>
+            </a:r>
+          </a:p>
+          <a:p>
+            <a:pPr marL="342900" indent="-342900">
+              <a:lnSpc>
+                <a:spcPct val="90000"/>
+              </a:lnSpc>
+              <a:buFont typeface="Arial" panose="020B0604020202020204" pitchFamily="34" charset="0"/>
+              <a:buChar char="•"/>
+            </a:pPr>
+            <a:r>
               <a:rPr lang="en-HK" altLang="zh-TW" sz="2000" dirty="0"/>
               <a:t>Type P in a field if it is a pronoun. This includes:</a:t>
             </a:r>
           </a:p>
           <a:p>
-            <a:pPr marL="1028700" lvl="1" indent="-342900"/>
+            <a:pPr marL="1028700" lvl="1" indent="-342900">
+              <a:lnSpc>
+                <a:spcPct val="90000"/>
+              </a:lnSpc>
+            </a:pPr>
             <a:r>
               <a:rPr lang="en-HK" altLang="zh-TW" dirty="0"/>
               <a:t>Personal pronouns: </a:t>
@@ -5340,7 +5467,11 @@
             <a:endParaRPr lang="en-HK" altLang="zh-TW" dirty="0"/>
           </a:p>
           <a:p>
-            <a:pPr marL="1028700" lvl="1" indent="-342900"/>
+            <a:pPr marL="1028700" lvl="1" indent="-342900">
+              <a:lnSpc>
+                <a:spcPct val="90000"/>
+              </a:lnSpc>
+            </a:pPr>
             <a:r>
               <a:rPr lang="en-HK" altLang="zh-TW" dirty="0"/>
               <a:t>Demonstrative pronouns </a:t>
@@ -5376,7 +5507,11 @@
             <a:endParaRPr lang="en-HK" altLang="zh-TW" dirty="0"/>
           </a:p>
           <a:p>
-            <a:pPr marL="1028700" lvl="1" indent="-342900"/>
+            <a:pPr marL="1028700" lvl="1" indent="-342900">
+              <a:lnSpc>
+                <a:spcPct val="90000"/>
+              </a:lnSpc>
+            </a:pPr>
             <a:r>
               <a:rPr lang="en-HK" altLang="zh-TW" dirty="0"/>
               <a:t>Interrogative and indefinite pronouns: </a:t>
@@ -5397,6 +5532,9 @@
           </a:p>
           <a:p>
             <a:pPr lvl="1" indent="0">
+              <a:lnSpc>
+                <a:spcPct val="90000"/>
+              </a:lnSpc>
               <a:buNone/>
             </a:pPr>
             <a:r>
@@ -5436,10 +5574,10 @@
       </p:sp>
       <p:cxnSp>
         <p:nvCxnSpPr>
-          <p:cNvPr id="14" name="Straight Connector 13">
-            <a:extLst>
-              <a:ext uri="{FF2B5EF4-FFF2-40B4-BE49-F238E27FC236}">
-                <a16:creationId xmlns:a16="http://schemas.microsoft.com/office/drawing/2014/main" id="{8DF3F0BE-4FF5-481A-9206-F765D61B5F6A}"/>
+          <p:cNvPr id="27" name="Straight Connector 26">
+            <a:extLst>
+              <a:ext uri="{FF2B5EF4-FFF2-40B4-BE49-F238E27FC236}">
+                <a16:creationId xmlns:a16="http://schemas.microsoft.com/office/drawing/2014/main" id="{38045D80-B59B-4760-8DF9-AECD53044DA6}"/>
               </a:ext>
               <a:ext uri="{C183D7F6-B498-43B3-948B-1728B52AA6E4}">
                 <adec:decorative xmlns:adec="http://schemas.microsoft.com/office/drawing/2017/decorative" val="1"/>
@@ -5526,7 +5664,7 @@
       </p:grpSpPr>
       <p:sp useBgFill="1">
         <p:nvSpPr>
-          <p:cNvPr id="8" name="Rectangle 7">
+          <p:cNvPr id="19" name="Rectangle 18">
             <a:extLst>
               <a:ext uri="{FF2B5EF4-FFF2-40B4-BE49-F238E27FC236}">
                 <a16:creationId xmlns:a16="http://schemas.microsoft.com/office/drawing/2014/main" id="{92B0CFF1-78D7-4A83-A95E-71F9E3831622}"/>
@@ -5586,10 +5724,10 @@
       </p:sp>
       <p:sp>
         <p:nvSpPr>
-          <p:cNvPr id="10" name="Rectangle 9">
-            <a:extLst>
-              <a:ext uri="{FF2B5EF4-FFF2-40B4-BE49-F238E27FC236}">
-                <a16:creationId xmlns:a16="http://schemas.microsoft.com/office/drawing/2014/main" id="{9BD148E7-1EDB-4129-A130-04858F701441}"/>
+          <p:cNvPr id="21" name="Rectangle 20">
+            <a:extLst>
+              <a:ext uri="{FF2B5EF4-FFF2-40B4-BE49-F238E27FC236}">
+                <a16:creationId xmlns:a16="http://schemas.microsoft.com/office/drawing/2014/main" id="{EC84EE41-863A-4DE9-9A51-4F014D681F70}"/>
               </a:ext>
               <a:ext uri="{C183D7F6-B498-43B3-948B-1728B52AA6E4}">
                 <adec:decorative xmlns:adec="http://schemas.microsoft.com/office/drawing/2017/decorative" val="1"/>
@@ -5609,8 +5747,8 @@
         </p:nvSpPr>
         <p:spPr>
           <a:xfrm>
-            <a:off x="482600" y="489855"/>
-            <a:ext cx="11147071" cy="5851265"/>
+            <a:off x="479416" y="485369"/>
+            <a:ext cx="11147071" cy="2460838"/>
           </a:xfrm>
           <a:prstGeom prst="rect">
             <a:avLst/>
@@ -5667,18 +5805,18 @@
         </p:nvSpPr>
         <p:spPr>
           <a:xfrm>
-            <a:off x="680605" y="976160"/>
-            <a:ext cx="5415395" cy="4902115"/>
-          </a:xfrm>
-        </p:spPr>
-        <p:txBody>
-          <a:bodyPr anchor="ctr">
+            <a:off x="482601" y="976160"/>
+            <a:ext cx="8411120" cy="1493871"/>
+          </a:xfrm>
+        </p:spPr>
+        <p:txBody>
+          <a:bodyPr>
             <a:normAutofit/>
           </a:bodyPr>
           <a:lstStyle/>
           <a:p>
             <a:r>
-              <a:rPr lang="en-HK" dirty="0"/>
+              <a:rPr lang="en-HK" sz="7200"/>
               <a:t>Annotating person</a:t>
             </a:r>
           </a:p>
@@ -5686,10 +5824,10 @@
       </p:sp>
       <p:cxnSp>
         <p:nvCxnSpPr>
-          <p:cNvPr id="12" name="Straight Connector 11">
-            <a:extLst>
-              <a:ext uri="{FF2B5EF4-FFF2-40B4-BE49-F238E27FC236}">
-                <a16:creationId xmlns:a16="http://schemas.microsoft.com/office/drawing/2014/main" id="{8E1E68C9-4F6E-4640-AE06-FCA671F7D5A6}"/>
+          <p:cNvPr id="23" name="Straight Connector 22">
+            <a:extLst>
+              <a:ext uri="{FF2B5EF4-FFF2-40B4-BE49-F238E27FC236}">
+                <a16:creationId xmlns:a16="http://schemas.microsoft.com/office/drawing/2014/main" id="{23135360-3A7F-436F-B1EA-3628A78B57BD}"/>
               </a:ext>
               <a:ext uri="{C183D7F6-B498-43B3-948B-1728B52AA6E4}">
                 <adec:decorative xmlns:adec="http://schemas.microsoft.com/office/drawing/2017/decorative" val="1"/>
@@ -5736,6 +5874,58 @@
           </a:fontRef>
         </p:style>
       </p:cxnSp>
+      <p:cxnSp>
+        <p:nvCxnSpPr>
+          <p:cNvPr id="25" name="Straight Connector 24">
+            <a:extLst>
+              <a:ext uri="{FF2B5EF4-FFF2-40B4-BE49-F238E27FC236}">
+                <a16:creationId xmlns:a16="http://schemas.microsoft.com/office/drawing/2014/main" id="{08990BBA-8A0B-4EF5-A122-0815DEC19410}"/>
+              </a:ext>
+              <a:ext uri="{C183D7F6-B498-43B3-948B-1728B52AA6E4}">
+                <adec:decorative xmlns:adec="http://schemas.microsoft.com/office/drawing/2017/decorative" val="1"/>
+              </a:ext>
+            </a:extLst>
+          </p:cNvPr>
+          <p:cNvCxnSpPr>
+            <a:cxnSpLocks noGrp="1" noRot="1" noChangeAspect="1" noMove="1" noResize="1" noEditPoints="1" noAdjustHandles="1" noChangeArrowheads="1" noChangeShapeType="1"/>
+          </p:cNvCxnSpPr>
+          <p:nvPr>
+            <p:extLst>
+              <p:ext uri="{386F3935-93C4-4BCD-93E2-E3B085C9AB24}">
+                <p16:designElem xmlns:p16="http://schemas.microsoft.com/office/powerpoint/2015/main" val="1"/>
+              </p:ext>
+            </p:extLst>
+          </p:nvPr>
+        </p:nvCxnSpPr>
+        <p:spPr>
+          <a:xfrm>
+            <a:off x="482600" y="2918401"/>
+            <a:ext cx="11147071" cy="0"/>
+          </a:xfrm>
+          <a:prstGeom prst="line">
+            <a:avLst/>
+          </a:prstGeom>
+          <a:ln w="28575">
+            <a:solidFill>
+              <a:schemeClr val="tx1"/>
+            </a:solidFill>
+          </a:ln>
+        </p:spPr>
+        <p:style>
+          <a:lnRef idx="1">
+            <a:schemeClr val="dk1"/>
+          </a:lnRef>
+          <a:fillRef idx="0">
+            <a:schemeClr val="dk1"/>
+          </a:fillRef>
+          <a:effectRef idx="0">
+            <a:schemeClr val="dk1"/>
+          </a:effectRef>
+          <a:fontRef idx="minor">
+            <a:schemeClr val="tx1"/>
+          </a:fontRef>
+        </p:style>
+      </p:cxnSp>
       <p:sp>
         <p:nvSpPr>
           <p:cNvPr id="3" name="Content Placeholder 2">
@@ -5754,12 +5944,12 @@
         </p:nvSpPr>
         <p:spPr>
           <a:xfrm>
-            <a:off x="6324144" y="976160"/>
-            <a:ext cx="5114069" cy="4902125"/>
-          </a:xfrm>
-        </p:spPr>
-        <p:txBody>
-          <a:bodyPr anchor="ctr">
+            <a:off x="482600" y="3408254"/>
+            <a:ext cx="8411119" cy="2470031"/>
+          </a:xfrm>
+        </p:spPr>
+        <p:txBody>
+          <a:bodyPr>
             <a:normAutofit/>
           </a:bodyPr>
           <a:lstStyle/>
@@ -5770,31 +5960,11 @@
             </a:pPr>
             <a:r>
               <a:rPr lang="en-HK" sz="2000" dirty="0"/>
-              <a:t>If something is first person (</a:t>
-            </a:r>
-            <a:r>
-              <a:rPr lang="zh-TW" altLang="en-US" sz="2000" dirty="0"/>
-              <a:t>我</a:t>
-            </a:r>
-            <a:r>
-              <a:rPr lang="en-US" altLang="zh-TW" sz="2000" dirty="0"/>
-              <a:t>,</a:t>
-            </a:r>
-            <a:r>
-              <a:rPr lang="zh-TW" altLang="en-US" sz="2000" dirty="0"/>
-              <a:t> 我們</a:t>
-            </a:r>
-            <a:r>
-              <a:rPr lang="en-US" altLang="zh-TW" sz="2000" dirty="0"/>
-              <a:t>,</a:t>
-            </a:r>
-            <a:r>
-              <a:rPr lang="zh-TW" altLang="en-US" sz="2000" dirty="0"/>
-              <a:t> 咱們</a:t>
-            </a:r>
-            <a:r>
-              <a:rPr lang="en-HK" altLang="zh-TW" sz="2000" dirty="0"/>
-              <a:t>…): Write 1</a:t>
+              <a:t>Choose </a:t>
+            </a:r>
+            <a:r>
+              <a:rPr lang="en-HK" sz="2000"/>
+              <a:t>the person field</a:t>
             </a:r>
           </a:p>
           <a:p>
@@ -5804,6 +5974,40 @@
             </a:pPr>
             <a:r>
               <a:rPr lang="en-HK" sz="2000" dirty="0"/>
+              <a:t>If something is first person (</a:t>
+            </a:r>
+            <a:r>
+              <a:rPr lang="zh-TW" altLang="en-US" sz="2000" dirty="0"/>
+              <a:t>我</a:t>
+            </a:r>
+            <a:r>
+              <a:rPr lang="en-US" altLang="zh-TW" sz="2000" dirty="0"/>
+              <a:t>,</a:t>
+            </a:r>
+            <a:r>
+              <a:rPr lang="zh-TW" altLang="en-US" sz="2000" dirty="0"/>
+              <a:t> 我們</a:t>
+            </a:r>
+            <a:r>
+              <a:rPr lang="en-US" altLang="zh-TW" sz="2000" dirty="0"/>
+              <a:t>,</a:t>
+            </a:r>
+            <a:r>
+              <a:rPr lang="zh-TW" altLang="en-US" sz="2000" dirty="0"/>
+              <a:t> 咱們</a:t>
+            </a:r>
+            <a:r>
+              <a:rPr lang="en-HK" altLang="zh-TW" sz="2000" dirty="0"/>
+              <a:t>…): Write 1</a:t>
+            </a:r>
+          </a:p>
+          <a:p>
+            <a:pPr marL="342900" indent="-342900">
+              <a:buFont typeface="Arial" panose="020B0604020202020204" pitchFamily="34" charset="0"/>
+              <a:buChar char="•"/>
+            </a:pPr>
+            <a:r>
+              <a:rPr lang="en-HK" sz="2000" dirty="0"/>
               <a:t>If something is second person (</a:t>
             </a:r>
             <a:r>
@@ -5841,10 +6045,10 @@
       </p:sp>
       <p:cxnSp>
         <p:nvCxnSpPr>
-          <p:cNvPr id="14" name="Straight Connector 13">
-            <a:extLst>
-              <a:ext uri="{FF2B5EF4-FFF2-40B4-BE49-F238E27FC236}">
-                <a16:creationId xmlns:a16="http://schemas.microsoft.com/office/drawing/2014/main" id="{8DF3F0BE-4FF5-481A-9206-F765D61B5F6A}"/>
+          <p:cNvPr id="27" name="Straight Connector 26">
+            <a:extLst>
+              <a:ext uri="{FF2B5EF4-FFF2-40B4-BE49-F238E27FC236}">
+                <a16:creationId xmlns:a16="http://schemas.microsoft.com/office/drawing/2014/main" id="{38045D80-B59B-4760-8DF9-AECD53044DA6}"/>
               </a:ext>
               <a:ext uri="{C183D7F6-B498-43B3-948B-1728B52AA6E4}">
                 <adec:decorative xmlns:adec="http://schemas.microsoft.com/office/drawing/2017/decorative" val="1"/>

</xml_diff>